<commit_message>
1 date = 1 row  => 1 date = x row
</commit_message>
<xml_diff>
--- a/docs/2024-12-02_Background.pptx
+++ b/docs/2024-12-02_Background.pptx
@@ -270,7 +270,7 @@
           <a:p>
             <a:fld id="{C2A14209-DDC5-4466-AD2B-718302D4640B}" type="datetimeFigureOut">
               <a:rPr lang="en-DE" smtClean="0"/>
-              <a:t>11/12/2024</a:t>
+              <a:t>02/05/2025</a:t>
             </a:fld>
             <a:endParaRPr lang="en-DE"/>
           </a:p>
@@ -324,7 +324,7 @@
           <a:p>
             <a:fld id="{11926C24-E1B8-470E-8ECE-199277C33672}" type="slidenum">
               <a:rPr lang="en-DE" smtClean="0"/>
-              <a:t>‹#›</a:t>
+              <a:t>‹Nr.›</a:t>
             </a:fld>
             <a:endParaRPr lang="en-DE"/>
           </a:p>
@@ -470,7 +470,7 @@
           <a:p>
             <a:fld id="{C2A14209-DDC5-4466-AD2B-718302D4640B}" type="datetimeFigureOut">
               <a:rPr lang="en-DE" smtClean="0"/>
-              <a:t>11/12/2024</a:t>
+              <a:t>02/05/2025</a:t>
             </a:fld>
             <a:endParaRPr lang="en-DE"/>
           </a:p>
@@ -524,7 +524,7 @@
           <a:p>
             <a:fld id="{11926C24-E1B8-470E-8ECE-199277C33672}" type="slidenum">
               <a:rPr lang="en-DE" smtClean="0"/>
-              <a:t>‹#›</a:t>
+              <a:t>‹Nr.›</a:t>
             </a:fld>
             <a:endParaRPr lang="en-DE"/>
           </a:p>
@@ -680,7 +680,7 @@
           <a:p>
             <a:fld id="{C2A14209-DDC5-4466-AD2B-718302D4640B}" type="datetimeFigureOut">
               <a:rPr lang="en-DE" smtClean="0"/>
-              <a:t>11/12/2024</a:t>
+              <a:t>02/05/2025</a:t>
             </a:fld>
             <a:endParaRPr lang="en-DE"/>
           </a:p>
@@ -734,7 +734,7 @@
           <a:p>
             <a:fld id="{11926C24-E1B8-470E-8ECE-199277C33672}" type="slidenum">
               <a:rPr lang="en-DE" smtClean="0"/>
-              <a:t>‹#›</a:t>
+              <a:t>‹Nr.›</a:t>
             </a:fld>
             <a:endParaRPr lang="en-DE"/>
           </a:p>
@@ -880,7 +880,7 @@
           <a:p>
             <a:fld id="{C2A14209-DDC5-4466-AD2B-718302D4640B}" type="datetimeFigureOut">
               <a:rPr lang="en-DE" smtClean="0"/>
-              <a:t>11/12/2024</a:t>
+              <a:t>02/05/2025</a:t>
             </a:fld>
             <a:endParaRPr lang="en-DE"/>
           </a:p>
@@ -934,7 +934,7 @@
           <a:p>
             <a:fld id="{11926C24-E1B8-470E-8ECE-199277C33672}" type="slidenum">
               <a:rPr lang="en-DE" smtClean="0"/>
-              <a:t>‹#›</a:t>
+              <a:t>‹Nr.›</a:t>
             </a:fld>
             <a:endParaRPr lang="en-DE"/>
           </a:p>
@@ -1156,7 +1156,7 @@
           <a:p>
             <a:fld id="{C2A14209-DDC5-4466-AD2B-718302D4640B}" type="datetimeFigureOut">
               <a:rPr lang="en-DE" smtClean="0"/>
-              <a:t>11/12/2024</a:t>
+              <a:t>02/05/2025</a:t>
             </a:fld>
             <a:endParaRPr lang="en-DE"/>
           </a:p>
@@ -1210,7 +1210,7 @@
           <a:p>
             <a:fld id="{11926C24-E1B8-470E-8ECE-199277C33672}" type="slidenum">
               <a:rPr lang="en-DE" smtClean="0"/>
-              <a:t>‹#›</a:t>
+              <a:t>‹Nr.›</a:t>
             </a:fld>
             <a:endParaRPr lang="en-DE"/>
           </a:p>
@@ -1424,7 +1424,7 @@
           <a:p>
             <a:fld id="{C2A14209-DDC5-4466-AD2B-718302D4640B}" type="datetimeFigureOut">
               <a:rPr lang="en-DE" smtClean="0"/>
-              <a:t>11/12/2024</a:t>
+              <a:t>02/05/2025</a:t>
             </a:fld>
             <a:endParaRPr lang="en-DE"/>
           </a:p>
@@ -1478,7 +1478,7 @@
           <a:p>
             <a:fld id="{11926C24-E1B8-470E-8ECE-199277C33672}" type="slidenum">
               <a:rPr lang="en-DE" smtClean="0"/>
-              <a:t>‹#›</a:t>
+              <a:t>‹Nr.›</a:t>
             </a:fld>
             <a:endParaRPr lang="en-DE"/>
           </a:p>
@@ -1839,7 +1839,7 @@
           <a:p>
             <a:fld id="{C2A14209-DDC5-4466-AD2B-718302D4640B}" type="datetimeFigureOut">
               <a:rPr lang="en-DE" smtClean="0"/>
-              <a:t>11/12/2024</a:t>
+              <a:t>02/05/2025</a:t>
             </a:fld>
             <a:endParaRPr lang="en-DE"/>
           </a:p>
@@ -1893,7 +1893,7 @@
           <a:p>
             <a:fld id="{11926C24-E1B8-470E-8ECE-199277C33672}" type="slidenum">
               <a:rPr lang="en-DE" smtClean="0"/>
-              <a:t>‹#›</a:t>
+              <a:t>‹Nr.›</a:t>
             </a:fld>
             <a:endParaRPr lang="en-DE"/>
           </a:p>
@@ -1981,7 +1981,7 @@
           <a:p>
             <a:fld id="{C2A14209-DDC5-4466-AD2B-718302D4640B}" type="datetimeFigureOut">
               <a:rPr lang="en-DE" smtClean="0"/>
-              <a:t>11/12/2024</a:t>
+              <a:t>02/05/2025</a:t>
             </a:fld>
             <a:endParaRPr lang="en-DE"/>
           </a:p>
@@ -2035,7 +2035,7 @@
           <a:p>
             <a:fld id="{11926C24-E1B8-470E-8ECE-199277C33672}" type="slidenum">
               <a:rPr lang="en-DE" smtClean="0"/>
-              <a:t>‹#›</a:t>
+              <a:t>‹Nr.›</a:t>
             </a:fld>
             <a:endParaRPr lang="en-DE"/>
           </a:p>
@@ -2094,7 +2094,7 @@
           <a:p>
             <a:fld id="{C2A14209-DDC5-4466-AD2B-718302D4640B}" type="datetimeFigureOut">
               <a:rPr lang="en-DE" smtClean="0"/>
-              <a:t>11/12/2024</a:t>
+              <a:t>02/05/2025</a:t>
             </a:fld>
             <a:endParaRPr lang="en-DE"/>
           </a:p>
@@ -2148,7 +2148,7 @@
           <a:p>
             <a:fld id="{11926C24-E1B8-470E-8ECE-199277C33672}" type="slidenum">
               <a:rPr lang="en-DE" smtClean="0"/>
-              <a:t>‹#›</a:t>
+              <a:t>‹Nr.›</a:t>
             </a:fld>
             <a:endParaRPr lang="en-DE"/>
           </a:p>
@@ -2407,7 +2407,7 @@
           <a:p>
             <a:fld id="{C2A14209-DDC5-4466-AD2B-718302D4640B}" type="datetimeFigureOut">
               <a:rPr lang="en-DE" smtClean="0"/>
-              <a:t>11/12/2024</a:t>
+              <a:t>02/05/2025</a:t>
             </a:fld>
             <a:endParaRPr lang="en-DE"/>
           </a:p>
@@ -2461,7 +2461,7 @@
           <a:p>
             <a:fld id="{11926C24-E1B8-470E-8ECE-199277C33672}" type="slidenum">
               <a:rPr lang="en-DE" smtClean="0"/>
-              <a:t>‹#›</a:t>
+              <a:t>‹Nr.›</a:t>
             </a:fld>
             <a:endParaRPr lang="en-DE"/>
           </a:p>
@@ -2696,7 +2696,7 @@
           <a:p>
             <a:fld id="{C2A14209-DDC5-4466-AD2B-718302D4640B}" type="datetimeFigureOut">
               <a:rPr lang="en-DE" smtClean="0"/>
-              <a:t>11/12/2024</a:t>
+              <a:t>02/05/2025</a:t>
             </a:fld>
             <a:endParaRPr lang="en-DE"/>
           </a:p>
@@ -2750,7 +2750,7 @@
           <a:p>
             <a:fld id="{11926C24-E1B8-470E-8ECE-199277C33672}" type="slidenum">
               <a:rPr lang="en-DE" smtClean="0"/>
-              <a:t>‹#›</a:t>
+              <a:t>‹Nr.›</a:t>
             </a:fld>
             <a:endParaRPr lang="en-DE"/>
           </a:p>
@@ -2939,7 +2939,7 @@
           <a:p>
             <a:fld id="{C2A14209-DDC5-4466-AD2B-718302D4640B}" type="datetimeFigureOut">
               <a:rPr lang="en-DE" smtClean="0"/>
-              <a:t>11/12/2024</a:t>
+              <a:t>02/05/2025</a:t>
             </a:fld>
             <a:endParaRPr lang="en-DE"/>
           </a:p>
@@ -3029,7 +3029,7 @@
           <a:p>
             <a:fld id="{11926C24-E1B8-470E-8ECE-199277C33672}" type="slidenum">
               <a:rPr lang="en-DE" smtClean="0"/>
-              <a:t>‹#›</a:t>
+              <a:t>‹Nr.›</a:t>
             </a:fld>
             <a:endParaRPr lang="en-DE"/>
           </a:p>
@@ -5876,7 +5876,19 @@
             </a:r>
             <a:r>
               <a:rPr lang="en-US" dirty="0"/>
-              <a:t> 1 row</a:t>
+              <a:t> </a:t>
+            </a:r>
+            <a:r>
+              <a:rPr lang="en-US" dirty="0">
+                <a:solidFill>
+                  <a:srgbClr val="FF0000"/>
+                </a:solidFill>
+              </a:rPr>
+              <a:t>x</a:t>
+            </a:r>
+            <a:r>
+              <a:rPr lang="en-US" dirty="0"/>
+              <a:t> row</a:t>
             </a:r>
             <a:endParaRPr lang="en-DE" dirty="0"/>
           </a:p>

</xml_diff>

<commit_message>
update figures and readme
</commit_message>
<xml_diff>
--- a/docs/2024-12-02_Background.pptx
+++ b/docs/2024-12-02_Background.pptx
@@ -8,7 +8,7 @@
     <p:sldId id="264" r:id="rId2"/>
     <p:sldId id="260" r:id="rId3"/>
     <p:sldId id="261" r:id="rId4"/>
-    <p:sldId id="267" r:id="rId5"/>
+    <p:sldId id="268" r:id="rId5"/>
     <p:sldId id="257" r:id="rId6"/>
     <p:sldId id="258" r:id="rId7"/>
     <p:sldId id="259" r:id="rId8"/>
@@ -270,7 +270,7 @@
           <a:p>
             <a:fld id="{C2A14209-DDC5-4466-AD2B-718302D4640B}" type="datetimeFigureOut">
               <a:rPr lang="en-DE" smtClean="0"/>
-              <a:t>10/03/2025</a:t>
+              <a:t>05/02/2026</a:t>
             </a:fld>
             <a:endParaRPr lang="en-DE"/>
           </a:p>
@@ -470,7 +470,7 @@
           <a:p>
             <a:fld id="{C2A14209-DDC5-4466-AD2B-718302D4640B}" type="datetimeFigureOut">
               <a:rPr lang="en-DE" smtClean="0"/>
-              <a:t>10/03/2025</a:t>
+              <a:t>05/02/2026</a:t>
             </a:fld>
             <a:endParaRPr lang="en-DE"/>
           </a:p>
@@ -680,7 +680,7 @@
           <a:p>
             <a:fld id="{C2A14209-DDC5-4466-AD2B-718302D4640B}" type="datetimeFigureOut">
               <a:rPr lang="en-DE" smtClean="0"/>
-              <a:t>10/03/2025</a:t>
+              <a:t>05/02/2026</a:t>
             </a:fld>
             <a:endParaRPr lang="en-DE"/>
           </a:p>
@@ -880,7 +880,7 @@
           <a:p>
             <a:fld id="{C2A14209-DDC5-4466-AD2B-718302D4640B}" type="datetimeFigureOut">
               <a:rPr lang="en-DE" smtClean="0"/>
-              <a:t>10/03/2025</a:t>
+              <a:t>05/02/2026</a:t>
             </a:fld>
             <a:endParaRPr lang="en-DE"/>
           </a:p>
@@ -1156,7 +1156,7 @@
           <a:p>
             <a:fld id="{C2A14209-DDC5-4466-AD2B-718302D4640B}" type="datetimeFigureOut">
               <a:rPr lang="en-DE" smtClean="0"/>
-              <a:t>10/03/2025</a:t>
+              <a:t>05/02/2026</a:t>
             </a:fld>
             <a:endParaRPr lang="en-DE"/>
           </a:p>
@@ -1424,7 +1424,7 @@
           <a:p>
             <a:fld id="{C2A14209-DDC5-4466-AD2B-718302D4640B}" type="datetimeFigureOut">
               <a:rPr lang="en-DE" smtClean="0"/>
-              <a:t>10/03/2025</a:t>
+              <a:t>05/02/2026</a:t>
             </a:fld>
             <a:endParaRPr lang="en-DE"/>
           </a:p>
@@ -1839,7 +1839,7 @@
           <a:p>
             <a:fld id="{C2A14209-DDC5-4466-AD2B-718302D4640B}" type="datetimeFigureOut">
               <a:rPr lang="en-DE" smtClean="0"/>
-              <a:t>10/03/2025</a:t>
+              <a:t>05/02/2026</a:t>
             </a:fld>
             <a:endParaRPr lang="en-DE"/>
           </a:p>
@@ -1981,7 +1981,7 @@
           <a:p>
             <a:fld id="{C2A14209-DDC5-4466-AD2B-718302D4640B}" type="datetimeFigureOut">
               <a:rPr lang="en-DE" smtClean="0"/>
-              <a:t>10/03/2025</a:t>
+              <a:t>05/02/2026</a:t>
             </a:fld>
             <a:endParaRPr lang="en-DE"/>
           </a:p>
@@ -2094,7 +2094,7 @@
           <a:p>
             <a:fld id="{C2A14209-DDC5-4466-AD2B-718302D4640B}" type="datetimeFigureOut">
               <a:rPr lang="en-DE" smtClean="0"/>
-              <a:t>10/03/2025</a:t>
+              <a:t>05/02/2026</a:t>
             </a:fld>
             <a:endParaRPr lang="en-DE"/>
           </a:p>
@@ -2407,7 +2407,7 @@
           <a:p>
             <a:fld id="{C2A14209-DDC5-4466-AD2B-718302D4640B}" type="datetimeFigureOut">
               <a:rPr lang="en-DE" smtClean="0"/>
-              <a:t>10/03/2025</a:t>
+              <a:t>05/02/2026</a:t>
             </a:fld>
             <a:endParaRPr lang="en-DE"/>
           </a:p>
@@ -2696,7 +2696,7 @@
           <a:p>
             <a:fld id="{C2A14209-DDC5-4466-AD2B-718302D4640B}" type="datetimeFigureOut">
               <a:rPr lang="en-DE" smtClean="0"/>
-              <a:t>10/03/2025</a:t>
+              <a:t>05/02/2026</a:t>
             </a:fld>
             <a:endParaRPr lang="en-DE"/>
           </a:p>
@@ -2939,7 +2939,7 @@
           <a:p>
             <a:fld id="{C2A14209-DDC5-4466-AD2B-718302D4640B}" type="datetimeFigureOut">
               <a:rPr lang="en-DE" smtClean="0"/>
-              <a:t>10/03/2025</a:t>
+              <a:t>05/02/2026</a:t>
             </a:fld>
             <a:endParaRPr lang="en-DE"/>
           </a:p>
@@ -4641,14 +4641,6 @@
 <file path=ppt/slides/slide4.xml><?xml version="1.0" encoding="utf-8"?>
 <p:sld xmlns:a="http://schemas.openxmlformats.org/drawingml/2006/main" xmlns:r="http://schemas.openxmlformats.org/officeDocument/2006/relationships" xmlns:p="http://schemas.openxmlformats.org/presentationml/2006/main">
   <p:cSld>
-    <p:bg>
-      <p:bgPr>
-        <a:solidFill>
-          <a:schemeClr val="bg1"/>
-        </a:solidFill>
-        <a:effectLst/>
-      </p:bgPr>
-    </p:bg>
     <p:spTree>
       <p:nvGrpSpPr>
         <p:cNvPr id="1" name=""/>
@@ -4708,8 +4700,8 @@
           <p:nvPr/>
         </p:nvSpPr>
         <p:spPr>
-          <a:xfrm flipV="1">
-            <a:off x="4122255" y="588961"/>
+          <a:xfrm>
+            <a:off x="4122255" y="251399"/>
             <a:ext cx="6765095" cy="5831979"/>
           </a:xfrm>
           <a:prstGeom prst="triangle">
@@ -4761,10 +4753,10 @@
       </p:sp>
       <p:pic>
         <p:nvPicPr>
-          <p:cNvPr id="15" name="Graphic 14" descr="Earth globe: Africa and Europe with solid fill">
-            <a:extLst>
-              <a:ext uri="{FF2B5EF4-FFF2-40B4-BE49-F238E27FC236}">
-                <a16:creationId xmlns:a16="http://schemas.microsoft.com/office/drawing/2014/main" id="{2175CF05-CB85-EAAD-7528-11BCDF418B61}"/>
+          <p:cNvPr id="17" name="Graphic 16" descr="Layers Design with solid fill">
+            <a:extLst>
+              <a:ext uri="{FF2B5EF4-FFF2-40B4-BE49-F238E27FC236}">
+                <a16:creationId xmlns:a16="http://schemas.microsoft.com/office/drawing/2014/main" id="{4BE4F183-C9E4-9476-DB2C-72ED0F41FA25}"/>
               </a:ext>
             </a:extLst>
           </p:cNvPr>
@@ -4778,78 +4770,6 @@
             <a:extLst>
               <a:ext uri="{96DAC541-7B7A-43D3-8B79-37D633B846F1}">
                 <asvg:svgBlip xmlns:asvg="http://schemas.microsoft.com/office/drawing/2016/SVG/main" r:embed="rId4"/>
-              </a:ext>
-            </a:extLst>
-          </a:blip>
-          <a:stretch>
-            <a:fillRect/>
-          </a:stretch>
-        </p:blipFill>
-        <p:spPr>
-          <a:xfrm>
-            <a:off x="6575530" y="437060"/>
-            <a:ext cx="1858547" cy="1858547"/>
-          </a:xfrm>
-          <a:prstGeom prst="rect">
-            <a:avLst/>
-          </a:prstGeom>
-        </p:spPr>
-      </p:pic>
-      <p:pic>
-        <p:nvPicPr>
-          <p:cNvPr id="16" name="Graphic 15" descr="Marker with solid fill">
-            <a:extLst>
-              <a:ext uri="{FF2B5EF4-FFF2-40B4-BE49-F238E27FC236}">
-                <a16:creationId xmlns:a16="http://schemas.microsoft.com/office/drawing/2014/main" id="{8CA7285C-4CEE-0D29-CE8D-BCC21CA9A783}"/>
-              </a:ext>
-            </a:extLst>
-          </p:cNvPr>
-          <p:cNvPicPr>
-            <a:picLocks noChangeAspect="1"/>
-          </p:cNvPicPr>
-          <p:nvPr/>
-        </p:nvPicPr>
-        <p:blipFill>
-          <a:blip r:embed="rId5">
-            <a:extLst>
-              <a:ext uri="{96DAC541-7B7A-43D3-8B79-37D633B846F1}">
-                <asvg:svgBlip xmlns:asvg="http://schemas.microsoft.com/office/drawing/2016/SVG/main" r:embed="rId6"/>
-              </a:ext>
-            </a:extLst>
-          </a:blip>
-          <a:stretch>
-            <a:fillRect/>
-          </a:stretch>
-        </p:blipFill>
-        <p:spPr>
-          <a:xfrm>
-            <a:off x="7649475" y="772958"/>
-            <a:ext cx="360000" cy="360000"/>
-          </a:xfrm>
-          <a:prstGeom prst="rect">
-            <a:avLst/>
-          </a:prstGeom>
-        </p:spPr>
-      </p:pic>
-      <p:pic>
-        <p:nvPicPr>
-          <p:cNvPr id="17" name="Graphic 16" descr="Layers Design with solid fill">
-            <a:extLst>
-              <a:ext uri="{FF2B5EF4-FFF2-40B4-BE49-F238E27FC236}">
-                <a16:creationId xmlns:a16="http://schemas.microsoft.com/office/drawing/2014/main" id="{4BE4F183-C9E4-9476-DB2C-72ED0F41FA25}"/>
-              </a:ext>
-            </a:extLst>
-          </p:cNvPr>
-          <p:cNvPicPr>
-            <a:picLocks noChangeAspect="1"/>
-          </p:cNvPicPr>
-          <p:nvPr/>
-        </p:nvPicPr>
-        <p:blipFill>
-          <a:blip r:embed="rId7">
-            <a:extLst>
-              <a:ext uri="{96DAC541-7B7A-43D3-8B79-37D633B846F1}">
-                <asvg:svgBlip xmlns:asvg="http://schemas.microsoft.com/office/drawing/2016/SVG/main" r:embed="rId8"/>
               </a:ext>
             </a:extLst>
           </a:blip>
@@ -4882,10 +4802,10 @@
           <p:nvPr/>
         </p:nvPicPr>
         <p:blipFill>
-          <a:blip r:embed="rId9">
+          <a:blip r:embed="rId5">
             <a:extLst>
               <a:ext uri="{96DAC541-7B7A-43D3-8B79-37D633B846F1}">
-                <asvg:svgBlip xmlns:asvg="http://schemas.microsoft.com/office/drawing/2016/SVG/main" r:embed="rId10"/>
+                <asvg:svgBlip xmlns:asvg="http://schemas.microsoft.com/office/drawing/2016/SVG/main" r:embed="rId6"/>
               </a:ext>
             </a:extLst>
           </a:blip>
@@ -4895,8 +4815,8 @@
         </p:blipFill>
         <p:spPr>
           <a:xfrm>
-            <a:off x="6924007" y="4469916"/>
-            <a:ext cx="1161592" cy="1161592"/>
+            <a:off x="7587505" y="4600843"/>
+            <a:ext cx="1080000" cy="1080000"/>
           </a:xfrm>
           <a:prstGeom prst="rect">
             <a:avLst/>
@@ -4919,8 +4839,8 @@
         </p:nvCxnSpPr>
         <p:spPr>
           <a:xfrm flipH="1">
-            <a:off x="1304649" y="2369368"/>
-            <a:ext cx="8556284" cy="0"/>
+            <a:off x="1304649" y="2295607"/>
+            <a:ext cx="7377878" cy="73761"/>
           </a:xfrm>
           <a:prstGeom prst="line">
             <a:avLst/>
@@ -4964,7 +4884,7 @@
         <p:spPr>
           <a:xfrm flipH="1">
             <a:off x="1304649" y="4110949"/>
-            <a:ext cx="7544118" cy="0"/>
+            <a:ext cx="8420465" cy="0"/>
           </a:xfrm>
           <a:prstGeom prst="line">
             <a:avLst/>
@@ -5005,8 +4925,8 @@
         </p:nvSpPr>
         <p:spPr>
           <a:xfrm>
-            <a:off x="2291087" y="1043167"/>
-            <a:ext cx="1771639" cy="646331"/>
+            <a:off x="1304649" y="1043167"/>
+            <a:ext cx="4186353" cy="646331"/>
           </a:xfrm>
           <a:prstGeom prst="rect">
             <a:avLst/>
@@ -5014,17 +4934,16 @@
           <a:noFill/>
         </p:spPr>
         <p:txBody>
-          <a:bodyPr wrap="none" rtlCol="0" anchor="ctr">
+          <a:bodyPr wrap="square" rtlCol="0" anchor="ctr">
             <a:spAutoFit/>
           </a:bodyPr>
           <a:lstStyle/>
           <a:p>
-            <a:pPr algn="ctr"/>
             <a:r>
               <a:rPr lang="en-US" sz="3600" dirty="0">
                 <a:latin typeface="Lato" panose="020F0502020204030203" pitchFamily="34" charset="0"/>
               </a:rPr>
-              <a:t>Locality</a:t>
+              <a:t>LOD1: Localities</a:t>
             </a:r>
           </a:p>
         </p:txBody>
@@ -5043,8 +4962,8 @@
         </p:nvSpPr>
         <p:spPr>
           <a:xfrm>
-            <a:off x="1872703" y="2888749"/>
-            <a:ext cx="2608406" cy="646331"/>
+            <a:off x="1304648" y="2888749"/>
+            <a:ext cx="4228754" cy="646331"/>
           </a:xfrm>
           <a:prstGeom prst="rect">
             <a:avLst/>
@@ -5052,17 +4971,16 @@
           <a:noFill/>
         </p:spPr>
         <p:txBody>
-          <a:bodyPr wrap="none" rtlCol="0" anchor="ctr">
+          <a:bodyPr wrap="square" rtlCol="0" anchor="ctr">
             <a:spAutoFit/>
           </a:bodyPr>
           <a:lstStyle/>
           <a:p>
-            <a:pPr algn="ctr"/>
             <a:r>
               <a:rPr lang="en-US" sz="3600" dirty="0">
                 <a:latin typeface="Lato" panose="020F0502020204030203" pitchFamily="34" charset="0"/>
               </a:rPr>
-              <a:t>Assemblage</a:t>
+              <a:t>LOD2: Assemblages</a:t>
             </a:r>
           </a:p>
         </p:txBody>
@@ -5081,8 +4999,8 @@
         </p:nvSpPr>
         <p:spPr>
           <a:xfrm>
-            <a:off x="2586841" y="4727546"/>
-            <a:ext cx="1180130" cy="646331"/>
+            <a:off x="1304647" y="4450547"/>
+            <a:ext cx="4681682" cy="1200329"/>
           </a:xfrm>
           <a:prstGeom prst="rect">
             <a:avLst/>
@@ -5090,17 +5008,27 @@
           <a:noFill/>
         </p:spPr>
         <p:txBody>
-          <a:bodyPr wrap="none" rtlCol="0" anchor="ctr">
+          <a:bodyPr wrap="square" rtlCol="0" anchor="ctr">
             <a:spAutoFit/>
           </a:bodyPr>
           <a:lstStyle/>
           <a:p>
-            <a:pPr algn="ctr"/>
             <a:r>
               <a:rPr lang="en-US" sz="3600" dirty="0">
                 <a:latin typeface="Lato" panose="020F0502020204030203" pitchFamily="34" charset="0"/>
               </a:rPr>
-              <a:t>Date</a:t>
+              <a:t>LOD3: Dates &amp;</a:t>
+            </a:r>
+            <a:br>
+              <a:rPr lang="en-US" sz="3600" dirty="0">
+                <a:latin typeface="Lato" panose="020F0502020204030203" pitchFamily="34" charset="0"/>
+              </a:rPr>
+            </a:br>
+            <a:r>
+              <a:rPr lang="en-US" sz="3600" dirty="0">
+                <a:latin typeface="Lato" panose="020F0502020204030203" pitchFamily="34" charset="0"/>
+              </a:rPr>
+              <a:t>Publications</a:t>
             </a:r>
           </a:p>
         </p:txBody>
@@ -5120,10 +5048,10 @@
           <p:nvPr/>
         </p:nvPicPr>
         <p:blipFill>
-          <a:blip r:embed="rId11">
+          <a:blip r:embed="rId7">
             <a:extLst>
               <a:ext uri="{96DAC541-7B7A-43D3-8B79-37D633B846F1}">
-                <asvg:svgBlip xmlns:asvg="http://schemas.microsoft.com/office/drawing/2016/SVG/main" r:embed="rId12"/>
+                <asvg:svgBlip xmlns:asvg="http://schemas.microsoft.com/office/drawing/2016/SVG/main" r:embed="rId8"/>
               </a:ext>
             </a:extLst>
           </a:blip>
@@ -5133,7 +5061,7 @@
         </p:blipFill>
         <p:spPr>
           <a:xfrm rot="21149331">
-            <a:off x="8084797" y="2457455"/>
+            <a:off x="7903534" y="2276635"/>
             <a:ext cx="720000" cy="720000"/>
           </a:xfrm>
           <a:prstGeom prst="rect">
@@ -5156,10 +5084,10 @@
           <p:nvPr/>
         </p:nvPicPr>
         <p:blipFill>
-          <a:blip r:embed="rId13">
+          <a:blip r:embed="rId9">
             <a:extLst>
               <a:ext uri="{96DAC541-7B7A-43D3-8B79-37D633B846F1}">
-                <asvg:svgBlip xmlns:asvg="http://schemas.microsoft.com/office/drawing/2016/SVG/main" r:embed="rId14"/>
+                <asvg:svgBlip xmlns:asvg="http://schemas.microsoft.com/office/drawing/2016/SVG/main" r:embed="rId10"/>
               </a:ext>
             </a:extLst>
           </a:blip>
@@ -5169,7 +5097,7 @@
         </p:blipFill>
         <p:spPr>
           <a:xfrm>
-            <a:off x="6242104" y="2515993"/>
+            <a:off x="6298598" y="2332487"/>
             <a:ext cx="720000" cy="720000"/>
           </a:xfrm>
           <a:prstGeom prst="rect">
@@ -5192,10 +5120,10 @@
           <p:nvPr/>
         </p:nvPicPr>
         <p:blipFill>
-          <a:blip r:embed="rId15">
+          <a:blip r:embed="rId11">
             <a:extLst>
               <a:ext uri="{96DAC541-7B7A-43D3-8B79-37D633B846F1}">
-                <asvg:svgBlip xmlns:asvg="http://schemas.microsoft.com/office/drawing/2016/SVG/main" r:embed="rId16"/>
+                <asvg:svgBlip xmlns:asvg="http://schemas.microsoft.com/office/drawing/2016/SVG/main" r:embed="rId12"/>
               </a:ext>
             </a:extLst>
           </a:blip>
@@ -5205,8 +5133,8 @@
         </p:blipFill>
         <p:spPr>
           <a:xfrm>
-            <a:off x="8009475" y="3312996"/>
-            <a:ext cx="720000" cy="720000"/>
+            <a:off x="8081008" y="3501352"/>
+            <a:ext cx="540000" cy="540000"/>
           </a:xfrm>
           <a:prstGeom prst="rect">
             <a:avLst/>
@@ -5228,10 +5156,10 @@
           <p:nvPr/>
         </p:nvPicPr>
         <p:blipFill>
-          <a:blip r:embed="rId17">
+          <a:blip r:embed="rId13">
             <a:extLst>
               <a:ext uri="{96DAC541-7B7A-43D3-8B79-37D633B846F1}">
-                <asvg:svgBlip xmlns:asvg="http://schemas.microsoft.com/office/drawing/2016/SVG/main" r:embed="rId18"/>
+                <asvg:svgBlip xmlns:asvg="http://schemas.microsoft.com/office/drawing/2016/SVG/main" r:embed="rId14"/>
               </a:ext>
             </a:extLst>
           </a:blip>
@@ -5241,8 +5169,209 @@
         </p:blipFill>
         <p:spPr>
           <a:xfrm rot="20848492">
-            <a:off x="6328662" y="3314029"/>
+            <a:off x="6240670" y="3382500"/>
             <a:ext cx="720000" cy="720000"/>
+          </a:xfrm>
+          <a:prstGeom prst="rect">
+            <a:avLst/>
+          </a:prstGeom>
+        </p:spPr>
+      </p:pic>
+      <p:grpSp>
+        <p:nvGrpSpPr>
+          <p:cNvPr id="9" name="Group 8">
+            <a:extLst>
+              <a:ext uri="{FF2B5EF4-FFF2-40B4-BE49-F238E27FC236}">
+                <a16:creationId xmlns:a16="http://schemas.microsoft.com/office/drawing/2014/main" id="{F7B01130-1399-5EF6-61EE-3E5393725782}"/>
+              </a:ext>
+            </a:extLst>
+          </p:cNvPr>
+          <p:cNvGrpSpPr/>
+          <p:nvPr/>
+        </p:nvGrpSpPr>
+        <p:grpSpPr>
+          <a:xfrm>
+            <a:off x="6779859" y="833093"/>
+            <a:ext cx="1440000" cy="1440000"/>
+            <a:chOff x="6575530" y="437060"/>
+            <a:chExt cx="1858547" cy="1858547"/>
+          </a:xfrm>
+        </p:grpSpPr>
+        <p:pic>
+          <p:nvPicPr>
+            <p:cNvPr id="15" name="Graphic 14" descr="Earth globe: Africa and Europe with solid fill">
+              <a:extLst>
+                <a:ext uri="{FF2B5EF4-FFF2-40B4-BE49-F238E27FC236}">
+                  <a16:creationId xmlns:a16="http://schemas.microsoft.com/office/drawing/2014/main" id="{2175CF05-CB85-EAAD-7528-11BCDF418B61}"/>
+                </a:ext>
+              </a:extLst>
+            </p:cNvPr>
+            <p:cNvPicPr>
+              <a:picLocks noChangeAspect="1"/>
+            </p:cNvPicPr>
+            <p:nvPr/>
+          </p:nvPicPr>
+          <p:blipFill>
+            <a:blip r:embed="rId15">
+              <a:extLst>
+                <a:ext uri="{96DAC541-7B7A-43D3-8B79-37D633B846F1}">
+                  <asvg:svgBlip xmlns:asvg="http://schemas.microsoft.com/office/drawing/2016/SVG/main" r:embed="rId16"/>
+                </a:ext>
+              </a:extLst>
+            </a:blip>
+            <a:stretch>
+              <a:fillRect/>
+            </a:stretch>
+          </p:blipFill>
+          <p:spPr>
+            <a:xfrm>
+              <a:off x="6575530" y="437060"/>
+              <a:ext cx="1858547" cy="1858547"/>
+            </a:xfrm>
+            <a:prstGeom prst="rect">
+              <a:avLst/>
+            </a:prstGeom>
+          </p:spPr>
+        </p:pic>
+        <p:pic>
+          <p:nvPicPr>
+            <p:cNvPr id="16" name="Graphic 15" descr="Marker with solid fill">
+              <a:extLst>
+                <a:ext uri="{FF2B5EF4-FFF2-40B4-BE49-F238E27FC236}">
+                  <a16:creationId xmlns:a16="http://schemas.microsoft.com/office/drawing/2014/main" id="{8CA7285C-4CEE-0D29-CE8D-BCC21CA9A783}"/>
+                </a:ext>
+              </a:extLst>
+            </p:cNvPr>
+            <p:cNvPicPr>
+              <a:picLocks noChangeAspect="1"/>
+            </p:cNvPicPr>
+            <p:nvPr/>
+          </p:nvPicPr>
+          <p:blipFill>
+            <a:blip r:embed="rId17">
+              <a:extLst>
+                <a:ext uri="{96DAC541-7B7A-43D3-8B79-37D633B846F1}">
+                  <asvg:svgBlip xmlns:asvg="http://schemas.microsoft.com/office/drawing/2016/SVG/main" r:embed="rId18"/>
+                </a:ext>
+              </a:extLst>
+            </a:blip>
+            <a:stretch>
+              <a:fillRect/>
+            </a:stretch>
+          </p:blipFill>
+          <p:spPr>
+            <a:xfrm>
+              <a:off x="7649475" y="772958"/>
+              <a:ext cx="360000" cy="360000"/>
+            </a:xfrm>
+            <a:prstGeom prst="rect">
+              <a:avLst/>
+            </a:prstGeom>
+          </p:spPr>
+        </p:pic>
+        <p:pic>
+          <p:nvPicPr>
+            <p:cNvPr id="44" name="Graphic 43" descr="Marker with solid fill">
+              <a:extLst>
+                <a:ext uri="{FF2B5EF4-FFF2-40B4-BE49-F238E27FC236}">
+                  <a16:creationId xmlns:a16="http://schemas.microsoft.com/office/drawing/2014/main" id="{7F9F2111-D592-C3CA-EE75-527CC9427273}"/>
+                </a:ext>
+              </a:extLst>
+            </p:cNvPr>
+            <p:cNvPicPr>
+              <a:picLocks noChangeAspect="1"/>
+            </p:cNvPicPr>
+            <p:nvPr/>
+          </p:nvPicPr>
+          <p:blipFill>
+            <a:blip r:embed="rId17">
+              <a:extLst>
+                <a:ext uri="{96DAC541-7B7A-43D3-8B79-37D633B846F1}">
+                  <asvg:svgBlip xmlns:asvg="http://schemas.microsoft.com/office/drawing/2016/SVG/main" r:embed="rId18"/>
+                </a:ext>
+              </a:extLst>
+            </a:blip>
+            <a:stretch>
+              <a:fillRect/>
+            </a:stretch>
+          </p:blipFill>
+          <p:spPr>
+            <a:xfrm>
+              <a:off x="7382775" y="1534282"/>
+              <a:ext cx="360000" cy="360000"/>
+            </a:xfrm>
+            <a:prstGeom prst="rect">
+              <a:avLst/>
+            </a:prstGeom>
+          </p:spPr>
+        </p:pic>
+        <p:pic>
+          <p:nvPicPr>
+            <p:cNvPr id="45" name="Graphic 44" descr="Marker with solid fill">
+              <a:extLst>
+                <a:ext uri="{FF2B5EF4-FFF2-40B4-BE49-F238E27FC236}">
+                  <a16:creationId xmlns:a16="http://schemas.microsoft.com/office/drawing/2014/main" id="{3670368E-0AA5-11F9-D297-2F1C2FDD9D51}"/>
+                </a:ext>
+              </a:extLst>
+            </p:cNvPr>
+            <p:cNvPicPr>
+              <a:picLocks noChangeAspect="1"/>
+            </p:cNvPicPr>
+            <p:nvPr/>
+          </p:nvPicPr>
+          <p:blipFill>
+            <a:blip r:embed="rId17">
+              <a:extLst>
+                <a:ext uri="{96DAC541-7B7A-43D3-8B79-37D633B846F1}">
+                  <asvg:svgBlip xmlns:asvg="http://schemas.microsoft.com/office/drawing/2016/SVG/main" r:embed="rId18"/>
+                </a:ext>
+              </a:extLst>
+            </a:blip>
+            <a:stretch>
+              <a:fillRect/>
+            </a:stretch>
+          </p:blipFill>
+          <p:spPr>
+            <a:xfrm>
+              <a:off x="7088186" y="1135306"/>
+              <a:ext cx="360000" cy="360000"/>
+            </a:xfrm>
+            <a:prstGeom prst="rect">
+              <a:avLst/>
+            </a:prstGeom>
+          </p:spPr>
+        </p:pic>
+      </p:grpSp>
+      <p:pic>
+        <p:nvPicPr>
+          <p:cNvPr id="3" name="Graphic 2" descr="Books with solid fill">
+            <a:extLst>
+              <a:ext uri="{FF2B5EF4-FFF2-40B4-BE49-F238E27FC236}">
+                <a16:creationId xmlns:a16="http://schemas.microsoft.com/office/drawing/2014/main" id="{1119AA37-9FD4-FB59-BB5F-B1910FABDDE7}"/>
+              </a:ext>
+            </a:extLst>
+          </p:cNvPr>
+          <p:cNvPicPr>
+            <a:picLocks noChangeAspect="1"/>
+          </p:cNvPicPr>
+          <p:nvPr/>
+        </p:nvPicPr>
+        <p:blipFill>
+          <a:blip r:embed="rId19">
+            <a:extLst>
+              <a:ext uri="{96DAC541-7B7A-43D3-8B79-37D633B846F1}">
+                <asvg:svgBlip xmlns:asvg="http://schemas.microsoft.com/office/drawing/2016/SVG/main" r:embed="rId20"/>
+              </a:ext>
+            </a:extLst>
+          </a:blip>
+          <a:stretch>
+            <a:fillRect/>
+          </a:stretch>
+        </p:blipFill>
+        <p:spPr>
+          <a:xfrm>
+            <a:off x="6422045" y="4600843"/>
+            <a:ext cx="1080000" cy="1080000"/>
           </a:xfrm>
           <a:prstGeom prst="rect">
             <a:avLst/>
@@ -5251,10 +5380,10 @@
       </p:pic>
       <p:pic>
         <p:nvPicPr>
-          <p:cNvPr id="44" name="Graphic 43" descr="Marker with solid fill">
-            <a:extLst>
-              <a:ext uri="{FF2B5EF4-FFF2-40B4-BE49-F238E27FC236}">
-                <a16:creationId xmlns:a16="http://schemas.microsoft.com/office/drawing/2014/main" id="{7F9F2111-D592-C3CA-EE75-527CC9427273}"/>
+          <p:cNvPr id="6" name="Graphic 5" descr="Bonfire with solid fill">
+            <a:extLst>
+              <a:ext uri="{FF2B5EF4-FFF2-40B4-BE49-F238E27FC236}">
+                <a16:creationId xmlns:a16="http://schemas.microsoft.com/office/drawing/2014/main" id="{47898A4F-FE3B-8536-1736-4FCBE2C15C53}"/>
               </a:ext>
             </a:extLst>
           </p:cNvPr>
@@ -5264,10 +5393,10 @@
           <p:nvPr/>
         </p:nvPicPr>
         <p:blipFill>
-          <a:blip r:embed="rId5">
+          <a:blip r:embed="rId21">
             <a:extLst>
               <a:ext uri="{96DAC541-7B7A-43D3-8B79-37D633B846F1}">
-                <asvg:svgBlip xmlns:asvg="http://schemas.microsoft.com/office/drawing/2016/SVG/main" r:embed="rId6"/>
+                <asvg:svgBlip xmlns:asvg="http://schemas.microsoft.com/office/drawing/2016/SVG/main" r:embed="rId22"/>
               </a:ext>
             </a:extLst>
           </a:blip>
@@ -5277,8 +5406,8 @@
         </p:blipFill>
         <p:spPr>
           <a:xfrm>
-            <a:off x="7382775" y="1534282"/>
-            <a:ext cx="360000" cy="360000"/>
+            <a:off x="5970449" y="3007581"/>
+            <a:ext cx="540000" cy="540000"/>
           </a:xfrm>
           <a:prstGeom prst="rect">
             <a:avLst/>
@@ -5287,10 +5416,10 @@
       </p:pic>
       <p:pic>
         <p:nvPicPr>
-          <p:cNvPr id="45" name="Graphic 44" descr="Marker with solid fill">
-            <a:extLst>
-              <a:ext uri="{FF2B5EF4-FFF2-40B4-BE49-F238E27FC236}">
-                <a16:creationId xmlns:a16="http://schemas.microsoft.com/office/drawing/2014/main" id="{3670368E-0AA5-11F9-D297-2F1C2FDD9D51}"/>
+          <p:cNvPr id="11" name="Graphic 10" descr="Shell with solid fill">
+            <a:extLst>
+              <a:ext uri="{FF2B5EF4-FFF2-40B4-BE49-F238E27FC236}">
+                <a16:creationId xmlns:a16="http://schemas.microsoft.com/office/drawing/2014/main" id="{1A3A7FCB-6671-D243-F034-EA574D41608D}"/>
               </a:ext>
             </a:extLst>
           </p:cNvPr>
@@ -5300,10 +5429,10 @@
           <p:nvPr/>
         </p:nvPicPr>
         <p:blipFill>
-          <a:blip r:embed="rId5">
+          <a:blip r:embed="rId23">
             <a:extLst>
               <a:ext uri="{96DAC541-7B7A-43D3-8B79-37D633B846F1}">
-                <asvg:svgBlip xmlns:asvg="http://schemas.microsoft.com/office/drawing/2016/SVG/main" r:embed="rId6"/>
+                <asvg:svgBlip xmlns:asvg="http://schemas.microsoft.com/office/drawing/2016/SVG/main" r:embed="rId24"/>
               </a:ext>
             </a:extLst>
           </a:blip>
@@ -5313,8 +5442,8 @@
         </p:blipFill>
         <p:spPr>
           <a:xfrm>
-            <a:off x="7088186" y="1135306"/>
-            <a:ext cx="360000" cy="360000"/>
+            <a:off x="8195617" y="2941075"/>
+            <a:ext cx="540000" cy="540000"/>
           </a:xfrm>
           <a:prstGeom prst="rect">
             <a:avLst/>
@@ -5324,7 +5453,7 @@
     </p:spTree>
     <p:extLst>
       <p:ext uri="{BB962C8B-B14F-4D97-AF65-F5344CB8AC3E}">
-        <p14:creationId xmlns:p14="http://schemas.microsoft.com/office/powerpoint/2010/main" val="2188804527"/>
+        <p14:creationId xmlns:p14="http://schemas.microsoft.com/office/powerpoint/2010/main" val="1999085104"/>
       </p:ext>
     </p:extLst>
   </p:cSld>

</xml_diff>